<commit_message>
Updated a presentation for lesson 5
</commit_message>
<xml_diff>
--- a/lesson 5/Lesson_5.pptx
+++ b/lesson 5/Lesson_5.pptx
@@ -5,7 +5,7 @@
     <p:sldMasterId id="2147483648" r:id="rId1"/>
   </p:sldMasterIdLst>
   <p:notesMasterIdLst>
-    <p:notesMasterId r:id="rId10"/>
+    <p:notesMasterId r:id="rId11"/>
   </p:notesMasterIdLst>
   <p:sldIdLst>
     <p:sldId id="256" r:id="rId2"/>
@@ -16,6 +16,7 @@
     <p:sldId id="274" r:id="rId7"/>
     <p:sldId id="277" r:id="rId8"/>
     <p:sldId id="275" r:id="rId9"/>
+    <p:sldId id="278" r:id="rId10"/>
   </p:sldIdLst>
   <p:sldSz cx="12192000" cy="6858000"/>
   <p:notesSz cx="6858000" cy="9144000"/>
@@ -128,7 +129,7 @@
     <p1510:client id="{0C6B8EF6-F8A4-7AB8-7F88-BD27EDEFE434}" v="2" dt="2021-12-02T05:38:51.155"/>
     <p1510:client id="{1D00F415-21C9-126B-D811-EECC4BD1021F}" v="336" dt="2021-12-08T16:55:26.595"/>
     <p1510:client id="{58A5EECA-69F4-A2C6-FD0E-DB58BAABE3E1}" v="170" dt="2021-12-08T11:52:11.015"/>
-    <p1510:client id="{8D6854E7-4F17-FE40-59D2-55336647B245}" v="331" dt="2021-12-08T17:20:42.959"/>
+    <p1510:client id="{8D6854E7-4F17-FE40-59D2-55336647B245}" v="392" dt="2021-12-08T17:31:06.388"/>
     <p1510:client id="{C89ACF45-C2F8-E76F-58EF-8272F11558CB}" v="235" dt="2021-12-02T10:05:05.975"/>
     <p1510:client id="{E143B352-6C6B-8238-531D-573B4674CE9C}" v="2349" dt="2021-12-07T09:23:16.743"/>
   </p1510:revLst>
@@ -9148,6 +9149,516 @@
     <p:extLst>
       <p:ext uri="{BB962C8B-B14F-4D97-AF65-F5344CB8AC3E}">
         <p14:creationId xmlns:p14="http://schemas.microsoft.com/office/powerpoint/2010/main" val="3288086044"/>
+      </p:ext>
+    </p:extLst>
+  </p:cSld>
+  <p:clrMapOvr>
+    <a:masterClrMapping/>
+  </p:clrMapOvr>
+</p:sld>
+</file>
+
+<file path=ppt/slides/slide9.xml><?xml version="1.0" encoding="utf-8"?>
+<p:sld xmlns:a="http://schemas.openxmlformats.org/drawingml/2006/main" xmlns:r="http://schemas.openxmlformats.org/officeDocument/2006/relationships" xmlns:p="http://schemas.openxmlformats.org/presentationml/2006/main">
+  <p:cSld>
+    <p:spTree>
+      <p:nvGrpSpPr>
+        <p:cNvPr id="1" name=""/>
+        <p:cNvGrpSpPr/>
+        <p:nvPr/>
+      </p:nvGrpSpPr>
+      <p:grpSpPr>
+        <a:xfrm>
+          <a:off x="0" y="0"/>
+          <a:ext cx="0" cy="0"/>
+          <a:chOff x="0" y="0"/>
+          <a:chExt cx="0" cy="0"/>
+        </a:xfrm>
+      </p:grpSpPr>
+      <p:sp>
+        <p:nvSpPr>
+          <p:cNvPr id="3" name="Прямоугольник 4">
+            <a:extLst>
+              <a:ext uri="{FF2B5EF4-FFF2-40B4-BE49-F238E27FC236}">
+                <a16:creationId xmlns:a16="http://schemas.microsoft.com/office/drawing/2014/main" id="{36CC0B9C-0EBE-4A1E-B58D-B636BD15693B}"/>
+              </a:ext>
+            </a:extLst>
+          </p:cNvPr>
+          <p:cNvSpPr/>
+          <p:nvPr/>
+        </p:nvSpPr>
+        <p:spPr>
+          <a:xfrm>
+            <a:off x="569167" y="242596"/>
+            <a:ext cx="11150082" cy="811763"/>
+          </a:xfrm>
+          <a:prstGeom prst="rect">
+            <a:avLst/>
+          </a:prstGeom>
+        </p:spPr>
+        <p:style>
+          <a:lnRef idx="2">
+            <a:schemeClr val="accent1">
+              <a:shade val="50000"/>
+            </a:schemeClr>
+          </a:lnRef>
+          <a:fillRef idx="1">
+            <a:schemeClr val="accent1"/>
+          </a:fillRef>
+          <a:effectRef idx="0">
+            <a:schemeClr val="accent1"/>
+          </a:effectRef>
+          <a:fontRef idx="minor">
+            <a:schemeClr val="lt1"/>
+          </a:fontRef>
+        </p:style>
+        <p:txBody>
+          <a:bodyPr lIns="91440" tIns="45720" rIns="91440" bIns="45720" rtlCol="0" anchor="ctr"/>
+          <a:lstStyle/>
+          <a:p>
+            <a:pPr algn="ctr"/>
+            <a:r>
+              <a:rPr lang="ru-RU" sz="3200" b="1" dirty="0" err="1">
+                <a:ln w="12700" cmpd="sng">
+                  <a:solidFill>
+                    <a:srgbClr val="FFC000"/>
+                  </a:solidFill>
+                  <a:prstDash val="solid"/>
+                </a:ln>
+                <a:solidFill>
+                  <a:srgbClr val="FFC000"/>
+                </a:solidFill>
+                <a:cs typeface="Calibri"/>
+              </a:rPr>
+              <a:t>None</a:t>
+            </a:r>
+            <a:r>
+              <a:rPr lang="ru-RU" sz="3200" b="1" dirty="0">
+                <a:ln w="12700" cmpd="sng">
+                  <a:solidFill>
+                    <a:srgbClr val="FFC000"/>
+                  </a:solidFill>
+                  <a:prstDash val="solid"/>
+                </a:ln>
+                <a:solidFill>
+                  <a:srgbClr val="FFC000"/>
+                </a:solidFill>
+                <a:cs typeface="Calibri"/>
+              </a:rPr>
+              <a:t> и </a:t>
+            </a:r>
+            <a:r>
+              <a:rPr lang="ru-RU" sz="3200" b="1" dirty="0" err="1">
+                <a:ln w="12700" cmpd="sng">
+                  <a:solidFill>
+                    <a:srgbClr val="FFC000"/>
+                  </a:solidFill>
+                  <a:prstDash val="solid"/>
+                </a:ln>
+                <a:solidFill>
+                  <a:srgbClr val="FFC000"/>
+                </a:solidFill>
+                <a:cs typeface="Calibri"/>
+              </a:rPr>
+              <a:t>pass</a:t>
+            </a:r>
+            <a:r>
+              <a:rPr lang="ru-RU" sz="3200" b="1" dirty="0">
+                <a:ln w="12700" cmpd="sng">
+                  <a:solidFill>
+                    <a:srgbClr val="FFC000"/>
+                  </a:solidFill>
+                  <a:prstDash val="solid"/>
+                </a:ln>
+                <a:solidFill>
+                  <a:srgbClr val="FFC000"/>
+                </a:solidFill>
+                <a:cs typeface="Calibri"/>
+              </a:rPr>
+              <a:t> в функциях</a:t>
+            </a:r>
+          </a:p>
+        </p:txBody>
+      </p:sp>
+      <p:sp>
+        <p:nvSpPr>
+          <p:cNvPr id="5" name="Rectangle: Rounded Corners 4">
+            <a:extLst>
+              <a:ext uri="{FF2B5EF4-FFF2-40B4-BE49-F238E27FC236}">
+                <a16:creationId xmlns:a16="http://schemas.microsoft.com/office/drawing/2014/main" id="{345097A7-3DDA-42EE-B1B5-948D82531DB4}"/>
+              </a:ext>
+            </a:extLst>
+          </p:cNvPr>
+          <p:cNvSpPr/>
+          <p:nvPr/>
+        </p:nvSpPr>
+        <p:spPr>
+          <a:xfrm>
+            <a:off x="7128721" y="1766093"/>
+            <a:ext cx="4122613" cy="1113693"/>
+          </a:xfrm>
+          <a:prstGeom prst="roundRect">
+            <a:avLst/>
+          </a:prstGeom>
+        </p:spPr>
+        <p:style>
+          <a:lnRef idx="2">
+            <a:schemeClr val="accent1">
+              <a:shade val="50000"/>
+            </a:schemeClr>
+          </a:lnRef>
+          <a:fillRef idx="1">
+            <a:schemeClr val="accent1"/>
+          </a:fillRef>
+          <a:effectRef idx="0">
+            <a:schemeClr val="accent1"/>
+          </a:effectRef>
+          <a:fontRef idx="minor">
+            <a:schemeClr val="lt1"/>
+          </a:fontRef>
+        </p:style>
+        <p:txBody>
+          <a:bodyPr lIns="91440" tIns="45720" rIns="91440" bIns="45720" rtlCol="0" anchor="ctr"/>
+          <a:lstStyle/>
+          <a:p>
+            <a:r>
+              <a:rPr lang="en-US" dirty="0">
+                <a:solidFill>
+                  <a:schemeClr val="accent4"/>
+                </a:solidFill>
+                <a:ea typeface="+mn-lt"/>
+                <a:cs typeface="+mn-lt"/>
+              </a:rPr>
+              <a:t>     None </a:t>
+            </a:r>
+            <a:r>
+              <a:rPr lang="en-US" dirty="0">
+                <a:ea typeface="+mn-lt"/>
+                <a:cs typeface="+mn-lt"/>
+              </a:rPr>
+              <a:t>– </a:t>
+            </a:r>
+            <a:r>
+              <a:rPr lang="en-US" dirty="0" err="1">
+                <a:ea typeface="+mn-lt"/>
+                <a:cs typeface="+mn-lt"/>
+              </a:rPr>
+              <a:t>это</a:t>
+            </a:r>
+            <a:r>
+              <a:rPr lang="en-US" dirty="0">
+                <a:ea typeface="+mn-lt"/>
+                <a:cs typeface="+mn-lt"/>
+              </a:rPr>
+              <a:t> </a:t>
+            </a:r>
+            <a:r>
+              <a:rPr lang="en-US" dirty="0" err="1">
+                <a:ea typeface="+mn-lt"/>
+                <a:cs typeface="+mn-lt"/>
+              </a:rPr>
+              <a:t>специальный</a:t>
+            </a:r>
+            <a:r>
+              <a:rPr lang="en-US" dirty="0">
+                <a:ea typeface="+mn-lt"/>
+                <a:cs typeface="+mn-lt"/>
+              </a:rPr>
+              <a:t> </a:t>
+            </a:r>
+            <a:r>
+              <a:rPr lang="en-US" dirty="0" err="1">
+                <a:ea typeface="+mn-lt"/>
+                <a:cs typeface="+mn-lt"/>
+              </a:rPr>
+              <a:t>тип</a:t>
+            </a:r>
+            <a:r>
+              <a:rPr lang="en-US" dirty="0">
+                <a:ea typeface="+mn-lt"/>
+                <a:cs typeface="+mn-lt"/>
+              </a:rPr>
+              <a:t> </a:t>
+            </a:r>
+            <a:r>
+              <a:rPr lang="en-US" dirty="0" err="1">
+                <a:ea typeface="+mn-lt"/>
+                <a:cs typeface="+mn-lt"/>
+              </a:rPr>
+              <a:t>данных</a:t>
+            </a:r>
+            <a:r>
+              <a:rPr lang="en-US" dirty="0">
+                <a:ea typeface="+mn-lt"/>
+                <a:cs typeface="+mn-lt"/>
+              </a:rPr>
+              <a:t> в Python, </a:t>
+            </a:r>
+            <a:r>
+              <a:rPr lang="en-US" dirty="0" err="1">
+                <a:ea typeface="+mn-lt"/>
+                <a:cs typeface="+mn-lt"/>
+              </a:rPr>
+              <a:t>обозначающий</a:t>
+            </a:r>
+            <a:r>
+              <a:rPr lang="en-US" dirty="0">
+                <a:ea typeface="+mn-lt"/>
+                <a:cs typeface="+mn-lt"/>
+              </a:rPr>
+              <a:t> </a:t>
+            </a:r>
+            <a:r>
+              <a:rPr lang="en-US" dirty="0" err="1">
+                <a:ea typeface="+mn-lt"/>
+                <a:cs typeface="+mn-lt"/>
+              </a:rPr>
+              <a:t>ничего</a:t>
+            </a:r>
+            <a:r>
+              <a:rPr lang="en-US" dirty="0">
+                <a:ea typeface="+mn-lt"/>
+                <a:cs typeface="+mn-lt"/>
+              </a:rPr>
+              <a:t>.</a:t>
+            </a:r>
+            <a:endParaRPr lang="en-US" dirty="0" err="1">
+              <a:ea typeface="+mn-lt"/>
+              <a:cs typeface="+mn-lt"/>
+            </a:endParaRPr>
+          </a:p>
+        </p:txBody>
+      </p:sp>
+      <p:pic>
+        <p:nvPicPr>
+          <p:cNvPr id="4" name="Picture 5">
+            <a:extLst>
+              <a:ext uri="{FF2B5EF4-FFF2-40B4-BE49-F238E27FC236}">
+                <a16:creationId xmlns:a16="http://schemas.microsoft.com/office/drawing/2014/main" id="{66FB7525-7629-4FD7-9434-4BCB53A9FC92}"/>
+              </a:ext>
+            </a:extLst>
+          </p:cNvPr>
+          <p:cNvPicPr>
+            <a:picLocks noChangeAspect="1"/>
+          </p:cNvPicPr>
+          <p:nvPr/>
+        </p:nvPicPr>
+        <p:blipFill>
+          <a:blip r:embed="rId2"/>
+          <a:stretch>
+            <a:fillRect/>
+          </a:stretch>
+        </p:blipFill>
+        <p:spPr>
+          <a:xfrm>
+            <a:off x="648677" y="2673229"/>
+            <a:ext cx="5101492" cy="1697159"/>
+          </a:xfrm>
+          <a:prstGeom prst="rect">
+            <a:avLst/>
+          </a:prstGeom>
+        </p:spPr>
+      </p:pic>
+      <p:sp>
+        <p:nvSpPr>
+          <p:cNvPr id="6" name="TextBox 5">
+            <a:extLst>
+              <a:ext uri="{FF2B5EF4-FFF2-40B4-BE49-F238E27FC236}">
+                <a16:creationId xmlns:a16="http://schemas.microsoft.com/office/drawing/2014/main" id="{DABB8DF9-1E64-4EEE-9BC9-2A49AF6CCB93}"/>
+              </a:ext>
+            </a:extLst>
+          </p:cNvPr>
+          <p:cNvSpPr txBox="1"/>
+          <p:nvPr/>
+        </p:nvSpPr>
+        <p:spPr>
+          <a:xfrm>
+            <a:off x="4724400" y="3200400"/>
+            <a:ext cx="2743200" cy="369332"/>
+          </a:xfrm>
+          <a:prstGeom prst="rect">
+            <a:avLst/>
+          </a:prstGeom>
+          <a:noFill/>
+        </p:spPr>
+        <p:txBody>
+          <a:bodyPr rot="0" spcFirstLastPara="0" vertOverflow="overflow" horzOverflow="overflow" vert="horz" wrap="square" lIns="91440" tIns="45720" rIns="91440" bIns="45720" numCol="1" spcCol="0" rtlCol="0" fromWordArt="0" anchor="t" anchorCtr="0" forceAA="0" compatLnSpc="1">
+            <a:prstTxWarp prst="textNoShape">
+              <a:avLst/>
+            </a:prstTxWarp>
+            <a:spAutoFit/>
+          </a:bodyPr>
+          <a:lstStyle/>
+          <a:p>
+            <a:endParaRPr lang="en-US" dirty="0">
+              <a:cs typeface="Calibri"/>
+            </a:endParaRPr>
+          </a:p>
+        </p:txBody>
+      </p:sp>
+      <p:sp>
+        <p:nvSpPr>
+          <p:cNvPr id="7" name="Rectangle: Rounded Corners 6">
+            <a:extLst>
+              <a:ext uri="{FF2B5EF4-FFF2-40B4-BE49-F238E27FC236}">
+                <a16:creationId xmlns:a16="http://schemas.microsoft.com/office/drawing/2014/main" id="{0355EC1E-E4A9-44B2-9C4D-A43352C2746F}"/>
+              </a:ext>
+            </a:extLst>
+          </p:cNvPr>
+          <p:cNvSpPr/>
+          <p:nvPr/>
+        </p:nvSpPr>
+        <p:spPr>
+          <a:xfrm>
+            <a:off x="7128721" y="4394016"/>
+            <a:ext cx="4122613" cy="1113693"/>
+          </a:xfrm>
+          <a:prstGeom prst="roundRect">
+            <a:avLst/>
+          </a:prstGeom>
+        </p:spPr>
+        <p:style>
+          <a:lnRef idx="2">
+            <a:schemeClr val="accent1">
+              <a:shade val="50000"/>
+            </a:schemeClr>
+          </a:lnRef>
+          <a:fillRef idx="1">
+            <a:schemeClr val="accent1"/>
+          </a:fillRef>
+          <a:effectRef idx="0">
+            <a:schemeClr val="accent1"/>
+          </a:effectRef>
+          <a:fontRef idx="minor">
+            <a:schemeClr val="lt1"/>
+          </a:fontRef>
+        </p:style>
+        <p:txBody>
+          <a:bodyPr lIns="91440" tIns="45720" rIns="91440" bIns="45720" rtlCol="0" anchor="ctr"/>
+          <a:lstStyle/>
+          <a:p>
+            <a:r>
+              <a:rPr lang="en-US" dirty="0">
+                <a:ea typeface="+mn-lt"/>
+                <a:cs typeface="+mn-lt"/>
+              </a:rPr>
+              <a:t>   </a:t>
+            </a:r>
+            <a:r>
+              <a:rPr lang="en-US" dirty="0" err="1">
+                <a:ea typeface="+mn-lt"/>
+                <a:cs typeface="+mn-lt"/>
+              </a:rPr>
+              <a:t>Оператор</a:t>
+            </a:r>
+            <a:r>
+              <a:rPr lang="en-US" dirty="0">
+                <a:ea typeface="+mn-lt"/>
+                <a:cs typeface="+mn-lt"/>
+              </a:rPr>
+              <a:t> </a:t>
+            </a:r>
+            <a:r>
+              <a:rPr lang="en-US" dirty="0">
+                <a:solidFill>
+                  <a:schemeClr val="accent4"/>
+                </a:solidFill>
+                <a:ea typeface="+mn-lt"/>
+                <a:cs typeface="+mn-lt"/>
+              </a:rPr>
+              <a:t>pass </a:t>
+            </a:r>
+            <a:r>
+              <a:rPr lang="en-US" dirty="0" err="1">
+                <a:ea typeface="+mn-lt"/>
+                <a:cs typeface="+mn-lt"/>
+              </a:rPr>
+              <a:t>используется</a:t>
+            </a:r>
+            <a:r>
+              <a:rPr lang="en-US" dirty="0">
+                <a:ea typeface="+mn-lt"/>
+                <a:cs typeface="+mn-lt"/>
+              </a:rPr>
+              <a:t> в Python </a:t>
+            </a:r>
+            <a:r>
+              <a:rPr lang="en-US" dirty="0" err="1">
+                <a:ea typeface="+mn-lt"/>
+                <a:cs typeface="+mn-lt"/>
+              </a:rPr>
+              <a:t>для</a:t>
+            </a:r>
+            <a:r>
+              <a:rPr lang="en-US" dirty="0">
+                <a:ea typeface="+mn-lt"/>
+                <a:cs typeface="+mn-lt"/>
+              </a:rPr>
+              <a:t> </a:t>
+            </a:r>
+            <a:r>
+              <a:rPr lang="en-US" dirty="0" err="1">
+                <a:ea typeface="+mn-lt"/>
+                <a:cs typeface="+mn-lt"/>
+              </a:rPr>
+              <a:t>обозначения</a:t>
+            </a:r>
+            <a:r>
+              <a:rPr lang="en-US" dirty="0">
+                <a:ea typeface="+mn-lt"/>
+                <a:cs typeface="+mn-lt"/>
+              </a:rPr>
+              <a:t> </a:t>
+            </a:r>
+            <a:r>
+              <a:rPr lang="en-US" dirty="0" err="1">
+                <a:ea typeface="+mn-lt"/>
+                <a:cs typeface="+mn-lt"/>
+              </a:rPr>
+              <a:t>пустого</a:t>
+            </a:r>
+            <a:r>
+              <a:rPr lang="en-US" dirty="0">
+                <a:ea typeface="+mn-lt"/>
+                <a:cs typeface="+mn-lt"/>
+              </a:rPr>
+              <a:t> </a:t>
+            </a:r>
+            <a:r>
+              <a:rPr lang="en-US" dirty="0" err="1">
+                <a:ea typeface="+mn-lt"/>
+                <a:cs typeface="+mn-lt"/>
+              </a:rPr>
+              <a:t>блока</a:t>
+            </a:r>
+            <a:r>
+              <a:rPr lang="en-US" dirty="0">
+                <a:ea typeface="+mn-lt"/>
+                <a:cs typeface="+mn-lt"/>
+              </a:rPr>
+              <a:t> </a:t>
+            </a:r>
+            <a:r>
+              <a:rPr lang="en-US" dirty="0" err="1">
+                <a:ea typeface="+mn-lt"/>
+                <a:cs typeface="+mn-lt"/>
+              </a:rPr>
+              <a:t>команд</a:t>
+            </a:r>
+            <a:r>
+              <a:rPr lang="en-US" dirty="0">
+                <a:ea typeface="+mn-lt"/>
+                <a:cs typeface="+mn-lt"/>
+              </a:rPr>
+              <a:t>.</a:t>
+            </a:r>
+          </a:p>
+        </p:txBody>
+      </p:sp>
+    </p:spTree>
+    <p:extLst>
+      <p:ext uri="{BB962C8B-B14F-4D97-AF65-F5344CB8AC3E}">
+        <p14:creationId xmlns:p14="http://schemas.microsoft.com/office/powerpoint/2010/main" val="751532720"/>
       </p:ext>
     </p:extLst>
   </p:cSld>

</xml_diff>